<commit_message>
update repport and slides
</commit_message>
<xml_diff>
--- a/Rapport/IGOV_COTOI_MANSON_MAZARS_slides.pptx
+++ b/Rapport/IGOV_COTOI_MANSON_MAZARS_slides.pptx
@@ -234,7 +234,7 @@
           <a:p>
             <a:fld id="{A809325A-64D1-4370-A2F5-4F97B352F945}" type="datetimeFigureOut">
               <a:rPr lang="fr-FR" smtClean="0"/>
-              <a:t>17/01/2021</a:t>
+              <a:t>18/01/2021</a:t>
             </a:fld>
             <a:endParaRPr lang="fr-FR"/>
           </a:p>
@@ -1053,7 +1053,7 @@
           <a:p>
             <a:fld id="{F9457691-6218-4EB6-B625-5FCF872860BD}" type="datetime1">
               <a:rPr lang="fr-FR" smtClean="0"/>
-              <a:t>17/01/2021</a:t>
+              <a:t>18/01/2021</a:t>
             </a:fld>
             <a:endParaRPr lang="fr-FR"/>
           </a:p>
@@ -1223,7 +1223,7 @@
           <a:p>
             <a:fld id="{362D5CCD-00D4-4B4B-80CD-1D8257CDBBC5}" type="datetime1">
               <a:rPr lang="fr-FR" smtClean="0"/>
-              <a:t>17/01/2021</a:t>
+              <a:t>18/01/2021</a:t>
             </a:fld>
             <a:endParaRPr lang="fr-FR"/>
           </a:p>
@@ -1403,7 +1403,7 @@
           <a:p>
             <a:fld id="{120F9776-5F00-485A-98AA-9BEBF8943CB5}" type="datetime1">
               <a:rPr lang="fr-FR" smtClean="0"/>
-              <a:t>17/01/2021</a:t>
+              <a:t>18/01/2021</a:t>
             </a:fld>
             <a:endParaRPr lang="fr-FR"/>
           </a:p>
@@ -1573,7 +1573,7 @@
           <a:p>
             <a:fld id="{8D1EC365-BDC4-46C6-9FA0-2696CD89EEAC}" type="datetime1">
               <a:rPr lang="fr-FR" smtClean="0"/>
-              <a:t>17/01/2021</a:t>
+              <a:t>18/01/2021</a:t>
             </a:fld>
             <a:endParaRPr lang="fr-FR"/>
           </a:p>
@@ -1819,7 +1819,7 @@
           <a:p>
             <a:fld id="{40F0B999-19A3-416C-BA93-CB2B82D48EA9}" type="datetime1">
               <a:rPr lang="fr-FR" smtClean="0"/>
-              <a:t>17/01/2021</a:t>
+              <a:t>18/01/2021</a:t>
             </a:fld>
             <a:endParaRPr lang="fr-FR"/>
           </a:p>
@@ -2051,7 +2051,7 @@
           <a:p>
             <a:fld id="{902BAF6B-E222-4775-92EA-4754BD46AF1E}" type="datetime1">
               <a:rPr lang="fr-FR" smtClean="0"/>
-              <a:t>17/01/2021</a:t>
+              <a:t>18/01/2021</a:t>
             </a:fld>
             <a:endParaRPr lang="fr-FR"/>
           </a:p>
@@ -2418,7 +2418,7 @@
           <a:p>
             <a:fld id="{25AB26E8-C6DB-4AC2-AE25-ACB7C0E9F859}" type="datetime1">
               <a:rPr lang="fr-FR" smtClean="0"/>
-              <a:t>17/01/2021</a:t>
+              <a:t>18/01/2021</a:t>
             </a:fld>
             <a:endParaRPr lang="fr-FR"/>
           </a:p>
@@ -2536,7 +2536,7 @@
           <a:p>
             <a:fld id="{C91413E4-B04B-4F76-AB5D-7434A44B8E4C}" type="datetime1">
               <a:rPr lang="fr-FR" smtClean="0"/>
-              <a:t>17/01/2021</a:t>
+              <a:t>18/01/2021</a:t>
             </a:fld>
             <a:endParaRPr lang="fr-FR"/>
           </a:p>
@@ -2631,7 +2631,7 @@
           <a:p>
             <a:fld id="{77239440-4F1F-499B-A482-0F6DD6C1E12F}" type="datetime1">
               <a:rPr lang="fr-FR" smtClean="0"/>
-              <a:t>17/01/2021</a:t>
+              <a:t>18/01/2021</a:t>
             </a:fld>
             <a:endParaRPr lang="fr-FR"/>
           </a:p>
@@ -2908,7 +2908,7 @@
           <a:p>
             <a:fld id="{AE4DDC48-317F-446F-A676-491C472AB95F}" type="datetime1">
               <a:rPr lang="fr-FR" smtClean="0"/>
-              <a:t>17/01/2021</a:t>
+              <a:t>18/01/2021</a:t>
             </a:fld>
             <a:endParaRPr lang="fr-FR"/>
           </a:p>
@@ -3161,7 +3161,7 @@
           <a:p>
             <a:fld id="{96E19CE5-F9CD-42C0-B8A6-57610E3EFA86}" type="datetime1">
               <a:rPr lang="fr-FR" smtClean="0"/>
-              <a:t>17/01/2021</a:t>
+              <a:t>18/01/2021</a:t>
             </a:fld>
             <a:endParaRPr lang="fr-FR"/>
           </a:p>
@@ -3374,7 +3374,7 @@
           <a:p>
             <a:fld id="{3FF54C7D-BD3A-4C51-9D30-0A1A0E8DB293}" type="datetime1">
               <a:rPr lang="fr-FR" smtClean="0"/>
-              <a:t>17/01/2021</a:t>
+              <a:t>18/01/2021</a:t>
             </a:fld>
             <a:endParaRPr lang="fr-FR"/>
           </a:p>
@@ -8420,7 +8420,7 @@
           <p:cNvPr id="7" name="Title 1">
             <a:extLst>
               <a:ext uri="{FF2B5EF4-FFF2-40B4-BE49-F238E27FC236}">
-                <a16:creationId xmlns:lc="http://schemas.openxmlformats.org/drawingml/2006/lockedCanvas" xmlns:a16="http://schemas.microsoft.com/office/drawing/2014/main" xmlns="" id="{7144101A-8886-464E-94DC-613388484E9D}"/>
+                <a16:creationId xmlns="" xmlns:a16="http://schemas.microsoft.com/office/drawing/2014/main" xmlns:lc="http://schemas.openxmlformats.org/drawingml/2006/lockedCanvas" id="{7144101A-8886-464E-94DC-613388484E9D}"/>
               </a:ext>
             </a:extLst>
           </p:cNvPr>
@@ -8538,7 +8538,7 @@
           <p:cNvPr id="8" name="Content Placeholder 3">
             <a:extLst>
               <a:ext uri="{FF2B5EF4-FFF2-40B4-BE49-F238E27FC236}">
-                <a16:creationId xmlns:lc="http://schemas.openxmlformats.org/drawingml/2006/lockedCanvas" xmlns:a16="http://schemas.microsoft.com/office/drawing/2014/main" xmlns="" id="{4D8B68C3-9F06-4A29-907F-7B7770EC203B}"/>
+                <a16:creationId xmlns="" xmlns:a16="http://schemas.microsoft.com/office/drawing/2014/main" xmlns:lc="http://schemas.openxmlformats.org/drawingml/2006/lockedCanvas" id="{4D8B68C3-9F06-4A29-907F-7B7770EC203B}"/>
               </a:ext>
             </a:extLst>
           </p:cNvPr>
@@ -13051,7 +13051,7 @@
           <p:cNvPr id="12" name="Content Placeholder 2">
             <a:extLst>
               <a:ext uri="{FF2B5EF4-FFF2-40B4-BE49-F238E27FC236}">
-                <a16:creationId xmlns:lc="http://schemas.openxmlformats.org/drawingml/2006/lockedCanvas" xmlns:a16="http://schemas.microsoft.com/office/drawing/2014/main" xmlns="" id="{6359894D-DE80-44FE-9A5D-6949974FC28C}"/>
+                <a16:creationId xmlns="" xmlns:a16="http://schemas.microsoft.com/office/drawing/2014/main" xmlns:lc="http://schemas.openxmlformats.org/drawingml/2006/lockedCanvas" id="{6359894D-DE80-44FE-9A5D-6949974FC28C}"/>
               </a:ext>
             </a:extLst>
           </p:cNvPr>
@@ -13062,8 +13062,8 @@
         </p:nvSpPr>
         <p:spPr>
           <a:xfrm>
-            <a:off x="1636443" y="1540189"/>
-            <a:ext cx="8915400" cy="3777622"/>
+            <a:off x="1636443" y="1813506"/>
+            <a:ext cx="8915400" cy="3230987"/>
           </a:xfrm>
           <a:prstGeom prst="rect">
             <a:avLst/>
@@ -13414,25 +13414,11 @@
               <a:t>Goran </a:t>
             </a:r>
             <a:r>
-              <a:rPr lang="fr-FR" sz="2000" dirty="0" err="1">
+              <a:rPr lang="fr-FR" sz="2000" dirty="0" err="1" smtClean="0">
                 <a:cs typeface="Times New Roman" panose="02020603050405020304" pitchFamily="18" charset="0"/>
               </a:rPr>
               <a:t>Marby</a:t>
             </a:r>
-            <a:endParaRPr lang="fr-FR" sz="2000" dirty="0">
-              <a:cs typeface="Times New Roman" panose="02020603050405020304" pitchFamily="18" charset="0"/>
-            </a:endParaRPr>
-          </a:p>
-          <a:p>
-            <a:pPr indent="-285750"/>
-            <a:r>
-              <a:rPr lang="fr-FR" sz="2000" dirty="0">
-                <a:cs typeface="Times New Roman" panose="02020603050405020304" pitchFamily="18" charset="0"/>
-              </a:rPr>
-              <a:t>350 employés</a:t>
-            </a:r>
-          </a:p>
-          <a:p>
             <a:endParaRPr lang="fr-FR" sz="2000" dirty="0">
               <a:cs typeface="Times New Roman" panose="02020603050405020304" pitchFamily="18" charset="0"/>
             </a:endParaRPr>
@@ -13452,7 +13438,7 @@
         </p:nvGrpSpPr>
         <p:grpSpPr>
           <a:xfrm>
-            <a:off x="7784491" y="2305452"/>
+            <a:off x="7873846" y="2368826"/>
             <a:ext cx="3479954" cy="3067988"/>
             <a:chOff x="7666796" y="2393169"/>
             <a:chExt cx="3479954" cy="3067988"/>
@@ -13463,7 +13449,7 @@
             <p:cNvPr id="13" name="Picture 3" descr="A picture containing sky, road, outdoor, highway&#10;&#10;Description automatically generated">
               <a:extLst>
                 <a:ext uri="{FF2B5EF4-FFF2-40B4-BE49-F238E27FC236}">
-                  <a16:creationId xmlns:lc="http://schemas.openxmlformats.org/drawingml/2006/lockedCanvas" xmlns:a16="http://schemas.microsoft.com/office/drawing/2014/main" xmlns="" id="{8FF7AA28-37ED-4FC3-9805-C48D77FF5041}"/>
+                  <a16:creationId xmlns="" xmlns:a16="http://schemas.microsoft.com/office/drawing/2014/main" xmlns:lc="http://schemas.openxmlformats.org/drawingml/2006/lockedCanvas" id="{8FF7AA28-37ED-4FC3-9805-C48D77FF5041}"/>
                 </a:ext>
               </a:extLst>
             </p:cNvPr>
@@ -13507,7 +13493,7 @@
             <p:cNvPr id="14" name="TextBox 4">
               <a:extLst>
                 <a:ext uri="{FF2B5EF4-FFF2-40B4-BE49-F238E27FC236}">
-                  <a16:creationId xmlns:lc="http://schemas.openxmlformats.org/drawingml/2006/lockedCanvas" xmlns:a16="http://schemas.microsoft.com/office/drawing/2014/main" xmlns="" id="{85A3B9CA-8CA3-4D38-A989-F4D84E5E6255}"/>
+                  <a16:creationId xmlns="" xmlns:a16="http://schemas.microsoft.com/office/drawing/2014/main" xmlns:lc="http://schemas.openxmlformats.org/drawingml/2006/lockedCanvas" id="{85A3B9CA-8CA3-4D38-A989-F4D84E5E6255}"/>
                 </a:ext>
               </a:extLst>
             </p:cNvPr>
@@ -13659,7 +13645,7 @@
           <p:cNvPr id="15" name="Title 1">
             <a:extLst>
               <a:ext uri="{FF2B5EF4-FFF2-40B4-BE49-F238E27FC236}">
-                <a16:creationId xmlns:lc="http://schemas.openxmlformats.org/drawingml/2006/lockedCanvas" xmlns:a16="http://schemas.microsoft.com/office/drawing/2014/main" xmlns="" id="{7144101A-8886-464E-94DC-613388484E9D}"/>
+                <a16:creationId xmlns="" xmlns:a16="http://schemas.microsoft.com/office/drawing/2014/main" xmlns:lc="http://schemas.openxmlformats.org/drawingml/2006/lockedCanvas" id="{7144101A-8886-464E-94DC-613388484E9D}"/>
               </a:ext>
             </a:extLst>
           </p:cNvPr>
@@ -13882,7 +13868,7 @@
           <p:cNvPr id="7" name="Content Placeholder 7" descr="Graphical user interface&#10;&#10;Description automatically generated">
             <a:extLst>
               <a:ext uri="{FF2B5EF4-FFF2-40B4-BE49-F238E27FC236}">
-                <a16:creationId xmlns:lc="http://schemas.openxmlformats.org/drawingml/2006/lockedCanvas" xmlns:a16="http://schemas.microsoft.com/office/drawing/2014/main" xmlns="" id="{0C05600B-7973-4455-90F0-51457968756E}"/>
+                <a16:creationId xmlns="" xmlns:a16="http://schemas.microsoft.com/office/drawing/2014/main" xmlns:lc="http://schemas.openxmlformats.org/drawingml/2006/lockedCanvas" id="{0C05600B-7973-4455-90F0-51457968756E}"/>
               </a:ext>
             </a:extLst>
           </p:cNvPr>
@@ -13917,7 +13903,7 @@
           <p:cNvPr id="8" name="Content Placeholder 8">
             <a:extLst>
               <a:ext uri="{FF2B5EF4-FFF2-40B4-BE49-F238E27FC236}">
-                <a16:creationId xmlns:lc="http://schemas.openxmlformats.org/drawingml/2006/lockedCanvas" xmlns:a16="http://schemas.microsoft.com/office/drawing/2014/main" xmlns="" id="{49A63935-4224-4A5E-8EA5-4B25C01F658C}"/>
+                <a16:creationId xmlns="" xmlns:a16="http://schemas.microsoft.com/office/drawing/2014/main" xmlns:lc="http://schemas.openxmlformats.org/drawingml/2006/lockedCanvas" id="{49A63935-4224-4A5E-8EA5-4B25C01F658C}"/>
               </a:ext>
             </a:extLst>
           </p:cNvPr>
@@ -14348,7 +14334,7 @@
           <p:cNvPr id="9" name="Title 1">
             <a:extLst>
               <a:ext uri="{FF2B5EF4-FFF2-40B4-BE49-F238E27FC236}">
-                <a16:creationId xmlns:lc="http://schemas.openxmlformats.org/drawingml/2006/lockedCanvas" xmlns:a16="http://schemas.microsoft.com/office/drawing/2014/main" xmlns="" id="{7144101A-8886-464E-94DC-613388484E9D}"/>
+                <a16:creationId xmlns="" xmlns:a16="http://schemas.microsoft.com/office/drawing/2014/main" xmlns:lc="http://schemas.openxmlformats.org/drawingml/2006/lockedCanvas" id="{7144101A-8886-464E-94DC-613388484E9D}"/>
               </a:ext>
             </a:extLst>
           </p:cNvPr>
@@ -14466,7 +14452,7 @@
           <p:cNvPr id="10" name="TextBox 4">
             <a:extLst>
               <a:ext uri="{FF2B5EF4-FFF2-40B4-BE49-F238E27FC236}">
-                <a16:creationId xmlns:lc="http://schemas.openxmlformats.org/drawingml/2006/lockedCanvas" xmlns:a16="http://schemas.microsoft.com/office/drawing/2014/main" xmlns="" id="{85A3B9CA-8CA3-4D38-A989-F4D84E5E6255}"/>
+                <a16:creationId xmlns="" xmlns:a16="http://schemas.microsoft.com/office/drawing/2014/main" xmlns:lc="http://schemas.openxmlformats.org/drawingml/2006/lockedCanvas" id="{85A3B9CA-8CA3-4D38-A989-F4D84E5E6255}"/>
               </a:ext>
             </a:extLst>
           </p:cNvPr>
@@ -14719,7 +14705,7 @@
           <p:cNvPr id="7" name="Content Placeholder 4">
             <a:extLst>
               <a:ext uri="{FF2B5EF4-FFF2-40B4-BE49-F238E27FC236}">
-                <a16:creationId xmlns:lc="http://schemas.openxmlformats.org/drawingml/2006/lockedCanvas" xmlns:a16="http://schemas.microsoft.com/office/drawing/2014/main" xmlns="" id="{B2827535-66D3-48E0-9A89-356A28BF067F}"/>
+                <a16:creationId xmlns="" xmlns:a16="http://schemas.microsoft.com/office/drawing/2014/main" xmlns:lc="http://schemas.openxmlformats.org/drawingml/2006/lockedCanvas" id="{B2827535-66D3-48E0-9A89-356A28BF067F}"/>
               </a:ext>
             </a:extLst>
           </p:cNvPr>
@@ -14996,34 +14982,16 @@
           <a:p>
             <a:pPr lvl="1"/>
             <a:r>
+              <a:rPr lang="fr-FR" sz="2000" dirty="0" smtClean="0">
+                <a:cs typeface="Times New Roman" panose="02020603050405020304" pitchFamily="18" charset="0"/>
+              </a:rPr>
+              <a:t>RFC (</a:t>
+            </a:r>
+            <a:r>
               <a:rPr lang="fr-FR" sz="2000" dirty="0">
                 <a:cs typeface="Times New Roman" panose="02020603050405020304" pitchFamily="18" charset="0"/>
               </a:rPr>
-              <a:t>RFC(</a:t>
-            </a:r>
-            <a:r>
-              <a:rPr lang="fr-FR" sz="2000" dirty="0" err="1">
-                <a:cs typeface="Times New Roman" panose="02020603050405020304" pitchFamily="18" charset="0"/>
-              </a:rPr>
-              <a:t>Requests</a:t>
-            </a:r>
-            <a:r>
-              <a:rPr lang="fr-FR" sz="2000" dirty="0">
-                <a:cs typeface="Times New Roman" panose="02020603050405020304" pitchFamily="18" charset="0"/>
-              </a:rPr>
-              <a:t> For </a:t>
-            </a:r>
-            <a:r>
-              <a:rPr lang="fr-FR" sz="2000" dirty="0" err="1">
-                <a:cs typeface="Times New Roman" panose="02020603050405020304" pitchFamily="18" charset="0"/>
-              </a:rPr>
-              <a:t>Comments</a:t>
-            </a:r>
-            <a:r>
-              <a:rPr lang="fr-FR" sz="2000" dirty="0">
-                <a:cs typeface="Times New Roman" panose="02020603050405020304" pitchFamily="18" charset="0"/>
-              </a:rPr>
-              <a:t>)</a:t>
+              <a:t>Requests For Comments)</a:t>
             </a:r>
           </a:p>
           <a:p>
@@ -15040,7 +15008,25 @@
               <a:rPr lang="fr-FR" sz="2000" dirty="0">
                 <a:cs typeface="Times New Roman" panose="02020603050405020304" pitchFamily="18" charset="0"/>
               </a:rPr>
-              <a:t>1993 - enregistrement des noms de domaines de premier niveau et serveur root(A Root)</a:t>
+              <a:t>1993 - enregistrement des noms de domaines de premier niveau et serveur </a:t>
+            </a:r>
+            <a:r>
+              <a:rPr lang="fr-FR" sz="2000" dirty="0" err="1" smtClean="0">
+                <a:cs typeface="Times New Roman" panose="02020603050405020304" pitchFamily="18" charset="0"/>
+              </a:rPr>
+              <a:t>root</a:t>
+            </a:r>
+            <a:r>
+              <a:rPr lang="fr-FR" sz="2000" smtClean="0">
+                <a:cs typeface="Times New Roman" panose="02020603050405020304" pitchFamily="18" charset="0"/>
+              </a:rPr>
+              <a:t> (</a:t>
+            </a:r>
+            <a:r>
+              <a:rPr lang="fr-FR" sz="2000" dirty="0">
+                <a:cs typeface="Times New Roman" panose="02020603050405020304" pitchFamily="18" charset="0"/>
+              </a:rPr>
+              <a:t>A Root)</a:t>
             </a:r>
           </a:p>
           <a:p>
@@ -15098,7 +15084,7 @@
           <p:cNvPr id="8" name="Title 1">
             <a:extLst>
               <a:ext uri="{FF2B5EF4-FFF2-40B4-BE49-F238E27FC236}">
-                <a16:creationId xmlns:lc="http://schemas.openxmlformats.org/drawingml/2006/lockedCanvas" xmlns:a16="http://schemas.microsoft.com/office/drawing/2014/main" xmlns="" id="{7144101A-8886-464E-94DC-613388484E9D}"/>
+                <a16:creationId xmlns="" xmlns:a16="http://schemas.microsoft.com/office/drawing/2014/main" xmlns:lc="http://schemas.openxmlformats.org/drawingml/2006/lockedCanvas" id="{7144101A-8886-464E-94DC-613388484E9D}"/>
               </a:ext>
             </a:extLst>
           </p:cNvPr>
@@ -15335,7 +15321,7 @@
           <p:cNvPr id="7" name="Content Placeholder 2">
             <a:extLst>
               <a:ext uri="{FF2B5EF4-FFF2-40B4-BE49-F238E27FC236}">
-                <a16:creationId xmlns:lc="http://schemas.openxmlformats.org/drawingml/2006/lockedCanvas" xmlns:a16="http://schemas.microsoft.com/office/drawing/2014/main" xmlns="" id="{752D223E-5D8F-4FCF-8515-3C12B58A7717}"/>
+                <a16:creationId xmlns="" xmlns:a16="http://schemas.microsoft.com/office/drawing/2014/main" xmlns:lc="http://schemas.openxmlformats.org/drawingml/2006/lockedCanvas" id="{752D223E-5D8F-4FCF-8515-3C12B58A7717}"/>
               </a:ext>
             </a:extLst>
           </p:cNvPr>
@@ -15682,7 +15668,7 @@
           <p:cNvPr id="8" name="Title 1">
             <a:extLst>
               <a:ext uri="{FF2B5EF4-FFF2-40B4-BE49-F238E27FC236}">
-                <a16:creationId xmlns:lc="http://schemas.openxmlformats.org/drawingml/2006/lockedCanvas" xmlns:a16="http://schemas.microsoft.com/office/drawing/2014/main" xmlns="" id="{7144101A-8886-464E-94DC-613388484E9D}"/>
+                <a16:creationId xmlns="" xmlns:a16="http://schemas.microsoft.com/office/drawing/2014/main" xmlns:lc="http://schemas.openxmlformats.org/drawingml/2006/lockedCanvas" id="{7144101A-8886-464E-94DC-613388484E9D}"/>
               </a:ext>
             </a:extLst>
           </p:cNvPr>
@@ -15919,7 +15905,7 @@
           <p:cNvPr id="7" name="Content Placeholder 2">
             <a:extLst>
               <a:ext uri="{FF2B5EF4-FFF2-40B4-BE49-F238E27FC236}">
-                <a16:creationId xmlns:lc="http://schemas.openxmlformats.org/drawingml/2006/lockedCanvas" xmlns:a16="http://schemas.microsoft.com/office/drawing/2014/main" xmlns="" id="{A9364079-E9ED-4D1C-A3A5-83038272CF11}"/>
+                <a16:creationId xmlns="" xmlns:a16="http://schemas.microsoft.com/office/drawing/2014/main" xmlns:lc="http://schemas.openxmlformats.org/drawingml/2006/lockedCanvas" id="{A9364079-E9ED-4D1C-A3A5-83038272CF11}"/>
               </a:ext>
             </a:extLst>
           </p:cNvPr>
@@ -16269,7 +16255,7 @@
           <p:cNvPr id="8" name="Title 1">
             <a:extLst>
               <a:ext uri="{FF2B5EF4-FFF2-40B4-BE49-F238E27FC236}">
-                <a16:creationId xmlns:lc="http://schemas.openxmlformats.org/drawingml/2006/lockedCanvas" xmlns:a16="http://schemas.microsoft.com/office/drawing/2014/main" xmlns="" id="{7144101A-8886-464E-94DC-613388484E9D}"/>
+                <a16:creationId xmlns="" xmlns:a16="http://schemas.microsoft.com/office/drawing/2014/main" xmlns:lc="http://schemas.openxmlformats.org/drawingml/2006/lockedCanvas" id="{7144101A-8886-464E-94DC-613388484E9D}"/>
               </a:ext>
             </a:extLst>
           </p:cNvPr>

</xml_diff>